<commit_message>
fix css; work on presentation
</commit_message>
<xml_diff>
--- a/FinalPresentation.pptx
+++ b/FinalPresentation.pptx
@@ -6,13 +6,14 @@
   </p:sldMasterIdLst>
   <p:sldIdLst>
     <p:sldId id="256" r:id="rId2"/>
-    <p:sldId id="257" r:id="rId3"/>
-    <p:sldId id="258" r:id="rId4"/>
-    <p:sldId id="260" r:id="rId5"/>
-    <p:sldId id="261" r:id="rId6"/>
+    <p:sldId id="261" r:id="rId3"/>
+    <p:sldId id="257" r:id="rId4"/>
+    <p:sldId id="258" r:id="rId5"/>
+    <p:sldId id="260" r:id="rId6"/>
     <p:sldId id="263" r:id="rId7"/>
-    <p:sldId id="265" r:id="rId8"/>
-    <p:sldId id="267" r:id="rId9"/>
+    <p:sldId id="268" r:id="rId8"/>
+    <p:sldId id="265" r:id="rId9"/>
+    <p:sldId id="267" r:id="rId10"/>
   </p:sldIdLst>
   <p:sldSz cx="12192000" cy="6858000"/>
   <p:notesSz cx="6858000" cy="9144000"/>
@@ -111,6 +112,11 @@
       </a:defRPr>
     </a:lvl9pPr>
   </p:defaultTextStyle>
+  <p:extLst>
+    <p:ext uri="{EFAFB233-063F-42B5-8137-9DF3F51BA10A}">
+      <p15:sldGuideLst xmlns:p15="http://schemas.microsoft.com/office/powerpoint/2012/main"/>
+    </p:ext>
+  </p:extLst>
 </p:presentation>
 </file>
 
@@ -5447,7 +5453,7 @@
           <a:p>
             <a:pPr algn="ctr"/>
             <a:r>
-              <a:rPr lang="en-US" b="1" dirty="0" smtClean="0">
+              <a:rPr lang="en-US" sz="2600" b="1" dirty="0" smtClean="0">
                 <a:solidFill>
                   <a:schemeClr val="tx1"/>
                 </a:solidFill>
@@ -5523,159 +5529,56 @@
         </p:nvSpPr>
         <p:spPr>
           <a:xfrm>
-            <a:off x="611060" y="560832"/>
-            <a:ext cx="9057196" cy="1507067"/>
+            <a:off x="2271859" y="1885361"/>
+            <a:ext cx="6890191" cy="1517715"/>
           </a:xfrm>
         </p:spPr>
         <p:txBody>
           <a:bodyPr>
-            <a:normAutofit/>
+            <a:normAutofit fontScale="90000"/>
           </a:bodyPr>
           <a:lstStyle/>
           <a:p>
-            <a:r>
-              <a:rPr lang="en-US" sz="4000" b="1" dirty="0" smtClean="0">
+            <a:pPr algn="ctr"/>
+            <a:r>
+              <a:rPr lang="en-US" sz="6600" b="1" dirty="0" smtClean="0">
                 <a:solidFill>
                   <a:schemeClr val="accent4">
                     <a:lumMod val="20000"/>
                     <a:lumOff val="80000"/>
                   </a:schemeClr>
                 </a:solidFill>
-                <a:latin typeface="Times New Roman" charset="0"/>
-                <a:ea typeface="Times New Roman" charset="0"/>
-                <a:cs typeface="Times New Roman" charset="0"/>
               </a:rPr>
-              <a:t>Custom Trading algorithms</a:t>
-            </a:r>
-            <a:endParaRPr lang="en-US" sz="4000" b="1" dirty="0">
+              <a:t/>
+            </a:r>
+            <a:br>
+              <a:rPr lang="en-US" sz="6600" b="1" dirty="0" smtClean="0">
+                <a:solidFill>
+                  <a:schemeClr val="accent4">
+                    <a:lumMod val="20000"/>
+                    <a:lumOff val="80000"/>
+                  </a:schemeClr>
+                </a:solidFill>
+              </a:rPr>
+            </a:br>
+            <a:r>
+              <a:rPr lang="en-US" sz="5300" b="1" dirty="0" smtClean="0">
+                <a:solidFill>
+                  <a:schemeClr val="accent4">
+                    <a:lumMod val="20000"/>
+                    <a:lumOff val="80000"/>
+                  </a:schemeClr>
+                </a:solidFill>
+              </a:rPr>
+              <a:t>Demonstration!</a:t>
+            </a:r>
+            <a:endParaRPr lang="en-US" sz="5300" b="1" dirty="0">
               <a:solidFill>
                 <a:schemeClr val="accent4">
                   <a:lumMod val="20000"/>
                   <a:lumOff val="80000"/>
                 </a:schemeClr>
               </a:solidFill>
-              <a:latin typeface="Times New Roman" charset="0"/>
-              <a:ea typeface="Times New Roman" charset="0"/>
-              <a:cs typeface="Times New Roman" charset="0"/>
-            </a:endParaRPr>
-          </a:p>
-        </p:txBody>
-      </p:sp>
-      <p:sp>
-        <p:nvSpPr>
-          <p:cNvPr id="3" name="Content Placeholder 2"/>
-          <p:cNvSpPr>
-            <a:spLocks noGrp="1"/>
-          </p:cNvSpPr>
-          <p:nvPr>
-            <p:ph idx="1"/>
-          </p:nvPr>
-        </p:nvSpPr>
-        <p:spPr>
-          <a:xfrm>
-            <a:off x="611060" y="1901952"/>
-            <a:ext cx="9057196" cy="4337643"/>
-          </a:xfrm>
-        </p:spPr>
-        <p:txBody>
-          <a:bodyPr/>
-          <a:lstStyle/>
-          <a:p>
-            <a:r>
-              <a:rPr lang="en-US" b="1" dirty="0" smtClean="0">
-                <a:solidFill>
-                  <a:schemeClr val="tx1"/>
-                </a:solidFill>
-              </a:rPr>
-              <a:t>What does it do?</a:t>
-            </a:r>
-          </a:p>
-          <a:p>
-            <a:pPr lvl="1"/>
-            <a:r>
-              <a:rPr lang="en-US" b="1" dirty="0" smtClean="0">
-                <a:solidFill>
-                  <a:schemeClr val="tx1"/>
-                </a:solidFill>
-              </a:rPr>
-              <a:t>Allow individuals to test various trading and stock screening strategies</a:t>
-            </a:r>
-          </a:p>
-          <a:p>
-            <a:pPr lvl="1"/>
-            <a:r>
-              <a:rPr lang="en-US" b="1" dirty="0" smtClean="0">
-                <a:solidFill>
-                  <a:schemeClr val="tx1"/>
-                </a:solidFill>
-              </a:rPr>
-              <a:t>Takes user input, screens stocks, then buys &amp; sells each trading day</a:t>
-            </a:r>
-          </a:p>
-          <a:p>
-            <a:pPr lvl="1"/>
-            <a:r>
-              <a:rPr lang="en-US" b="1" dirty="0" smtClean="0">
-                <a:solidFill>
-                  <a:schemeClr val="tx1"/>
-                </a:solidFill>
-              </a:rPr>
-              <a:t>User can track performance of custom algorithm vs S&amp;P 500</a:t>
-            </a:r>
-          </a:p>
-          <a:p>
-            <a:r>
-              <a:rPr lang="en-US" b="1" dirty="0" smtClean="0">
-                <a:solidFill>
-                  <a:schemeClr val="tx1"/>
-                </a:solidFill>
-              </a:rPr>
-              <a:t>Why?</a:t>
-            </a:r>
-            <a:endParaRPr lang="en-US" b="1" dirty="0">
-              <a:solidFill>
-                <a:schemeClr val="tx1"/>
-              </a:solidFill>
-            </a:endParaRPr>
-          </a:p>
-          <a:p>
-            <a:pPr lvl="1"/>
-            <a:r>
-              <a:rPr lang="en-US" b="1" dirty="0" smtClean="0">
-                <a:solidFill>
-                  <a:schemeClr val="tx1"/>
-                </a:solidFill>
-              </a:rPr>
-              <a:t>Learn how to develop my own personal trading algorithms</a:t>
-            </a:r>
-            <a:endParaRPr lang="en-US" b="1" dirty="0">
-              <a:solidFill>
-                <a:schemeClr val="tx1"/>
-              </a:solidFill>
-            </a:endParaRPr>
-          </a:p>
-          <a:p>
-            <a:pPr lvl="1"/>
-            <a:r>
-              <a:rPr lang="en-US" b="1" dirty="0" smtClean="0">
-                <a:solidFill>
-                  <a:schemeClr val="tx1"/>
-                </a:solidFill>
-              </a:rPr>
-              <a:t>Test trading theories</a:t>
-            </a:r>
-            <a:endParaRPr lang="en-US" b="1" dirty="0">
-              <a:solidFill>
-                <a:schemeClr val="tx1"/>
-              </a:solidFill>
-            </a:endParaRPr>
-          </a:p>
-          <a:p>
-            <a:pPr lvl="1"/>
-            <a:endParaRPr lang="en-US" b="1" dirty="0" smtClean="0">
-              <a:solidFill>
-                <a:schemeClr val="tx1"/>
-              </a:solidFill>
             </a:endParaRPr>
           </a:p>
         </p:txBody>
@@ -5683,7 +5586,7 @@
     </p:spTree>
     <p:extLst>
       <p:ext uri="{BB962C8B-B14F-4D97-AF65-F5344CB8AC3E}">
-        <p14:creationId xmlns:p14="http://schemas.microsoft.com/office/powerpoint/2010/main" val="2034035074"/>
+        <p14:creationId xmlns:p14="http://schemas.microsoft.com/office/powerpoint/2010/main" val="816969576"/>
       </p:ext>
     </p:extLst>
   </p:cSld>
@@ -5722,6 +5625,226 @@
         </p:nvSpPr>
         <p:spPr>
           <a:xfrm>
+            <a:off x="611060" y="560832"/>
+            <a:ext cx="9057196" cy="1507067"/>
+          </a:xfrm>
+        </p:spPr>
+        <p:txBody>
+          <a:bodyPr>
+            <a:normAutofit/>
+          </a:bodyPr>
+          <a:lstStyle/>
+          <a:p>
+            <a:r>
+              <a:rPr lang="en-US" sz="4000" b="1" dirty="0" smtClean="0">
+                <a:solidFill>
+                  <a:schemeClr val="accent4">
+                    <a:lumMod val="20000"/>
+                    <a:lumOff val="80000"/>
+                  </a:schemeClr>
+                </a:solidFill>
+                <a:latin typeface="Times New Roman" charset="0"/>
+                <a:ea typeface="Times New Roman" charset="0"/>
+                <a:cs typeface="Times New Roman" charset="0"/>
+              </a:rPr>
+              <a:t>Custom Trading algorithms</a:t>
+            </a:r>
+            <a:endParaRPr lang="en-US" sz="4000" b="1" dirty="0">
+              <a:solidFill>
+                <a:schemeClr val="accent4">
+                  <a:lumMod val="20000"/>
+                  <a:lumOff val="80000"/>
+                </a:schemeClr>
+              </a:solidFill>
+              <a:latin typeface="Times New Roman" charset="0"/>
+              <a:ea typeface="Times New Roman" charset="0"/>
+              <a:cs typeface="Times New Roman" charset="0"/>
+            </a:endParaRPr>
+          </a:p>
+        </p:txBody>
+      </p:sp>
+      <p:sp>
+        <p:nvSpPr>
+          <p:cNvPr id="3" name="Content Placeholder 2"/>
+          <p:cNvSpPr>
+            <a:spLocks noGrp="1"/>
+          </p:cNvSpPr>
+          <p:nvPr>
+            <p:ph idx="1"/>
+          </p:nvPr>
+        </p:nvSpPr>
+        <p:spPr>
+          <a:xfrm>
+            <a:off x="611059" y="1901952"/>
+            <a:ext cx="9485047" cy="4337643"/>
+          </a:xfrm>
+        </p:spPr>
+        <p:txBody>
+          <a:bodyPr/>
+          <a:lstStyle/>
+          <a:p>
+            <a:r>
+              <a:rPr lang="en-US" b="1" dirty="0" smtClean="0">
+                <a:solidFill>
+                  <a:schemeClr val="tx1"/>
+                </a:solidFill>
+              </a:rPr>
+              <a:t>What does it do?</a:t>
+            </a:r>
+            <a:endParaRPr lang="en-US" b="1" dirty="0" smtClean="0">
+              <a:solidFill>
+                <a:schemeClr val="tx1"/>
+              </a:solidFill>
+            </a:endParaRPr>
+          </a:p>
+          <a:p>
+            <a:pPr lvl="1"/>
+            <a:r>
+              <a:rPr lang="en-US" b="1" dirty="0" smtClean="0">
+                <a:solidFill>
+                  <a:schemeClr val="tx1"/>
+                </a:solidFill>
+              </a:rPr>
+              <a:t>Allow individuals to </a:t>
+            </a:r>
+            <a:r>
+              <a:rPr lang="en-US" b="1" dirty="0" smtClean="0">
+                <a:solidFill>
+                  <a:schemeClr val="tx1"/>
+                </a:solidFill>
+              </a:rPr>
+              <a:t>back-test </a:t>
+            </a:r>
+            <a:r>
+              <a:rPr lang="en-US" b="1" dirty="0" smtClean="0">
+                <a:solidFill>
+                  <a:schemeClr val="tx1"/>
+                </a:solidFill>
+              </a:rPr>
+              <a:t>various trading and stock screening strategies</a:t>
+            </a:r>
+          </a:p>
+          <a:p>
+            <a:pPr lvl="1"/>
+            <a:r>
+              <a:rPr lang="en-US" b="1" dirty="0" smtClean="0">
+                <a:solidFill>
+                  <a:schemeClr val="tx1"/>
+                </a:solidFill>
+              </a:rPr>
+              <a:t>Takes user input, screens stocks, then buys &amp; sells each trading day</a:t>
+            </a:r>
+          </a:p>
+          <a:p>
+            <a:pPr lvl="1"/>
+            <a:r>
+              <a:rPr lang="en-US" b="1" dirty="0" smtClean="0">
+                <a:solidFill>
+                  <a:schemeClr val="tx1"/>
+                </a:solidFill>
+              </a:rPr>
+              <a:t>User can track performance of custom algorithm vs S&amp;P 500</a:t>
+            </a:r>
+          </a:p>
+          <a:p>
+            <a:r>
+              <a:rPr lang="en-US" b="1" dirty="0" smtClean="0">
+                <a:solidFill>
+                  <a:schemeClr val="tx1"/>
+                </a:solidFill>
+              </a:rPr>
+              <a:t>Why create a trading algorithm?</a:t>
+            </a:r>
+            <a:endParaRPr lang="en-US" b="1" dirty="0">
+              <a:solidFill>
+                <a:schemeClr val="tx1"/>
+              </a:solidFill>
+            </a:endParaRPr>
+          </a:p>
+          <a:p>
+            <a:pPr lvl="1"/>
+            <a:r>
+              <a:rPr lang="en-US" b="1" dirty="0" smtClean="0">
+                <a:solidFill>
+                  <a:schemeClr val="tx1"/>
+                </a:solidFill>
+              </a:rPr>
+              <a:t>Learn how to develop my own personal trading algorithms</a:t>
+            </a:r>
+            <a:endParaRPr lang="en-US" b="1" dirty="0">
+              <a:solidFill>
+                <a:schemeClr val="tx1"/>
+              </a:solidFill>
+            </a:endParaRPr>
+          </a:p>
+          <a:p>
+            <a:pPr lvl="1"/>
+            <a:r>
+              <a:rPr lang="en-US" b="1" dirty="0" smtClean="0">
+                <a:solidFill>
+                  <a:schemeClr val="tx1"/>
+                </a:solidFill>
+              </a:rPr>
+              <a:t>Test trading theories</a:t>
+            </a:r>
+            <a:endParaRPr lang="en-US" b="1" dirty="0">
+              <a:solidFill>
+                <a:schemeClr val="tx1"/>
+              </a:solidFill>
+            </a:endParaRPr>
+          </a:p>
+          <a:p>
+            <a:pPr lvl="1"/>
+            <a:endParaRPr lang="en-US" b="1" dirty="0" smtClean="0">
+              <a:solidFill>
+                <a:schemeClr val="tx1"/>
+              </a:solidFill>
+            </a:endParaRPr>
+          </a:p>
+        </p:txBody>
+      </p:sp>
+    </p:spTree>
+    <p:extLst>
+      <p:ext uri="{BB962C8B-B14F-4D97-AF65-F5344CB8AC3E}">
+        <p14:creationId xmlns:p14="http://schemas.microsoft.com/office/powerpoint/2010/main" val="2034035074"/>
+      </p:ext>
+    </p:extLst>
+  </p:cSld>
+  <p:clrMapOvr>
+    <a:masterClrMapping/>
+  </p:clrMapOvr>
+</p:sld>
+</file>
+
+<file path=ppt/slides/slide4.xml><?xml version="1.0" encoding="utf-8"?>
+<p:sld xmlns:a="http://schemas.openxmlformats.org/drawingml/2006/main" xmlns:r="http://schemas.openxmlformats.org/officeDocument/2006/relationships" xmlns:p="http://schemas.openxmlformats.org/presentationml/2006/main">
+  <p:cSld>
+    <p:spTree>
+      <p:nvGrpSpPr>
+        <p:cNvPr id="1" name=""/>
+        <p:cNvGrpSpPr/>
+        <p:nvPr/>
+      </p:nvGrpSpPr>
+      <p:grpSpPr>
+        <a:xfrm>
+          <a:off x="0" y="0"/>
+          <a:ext cx="0" cy="0"/>
+          <a:chOff x="0" y="0"/>
+          <a:chExt cx="0" cy="0"/>
+        </a:xfrm>
+      </p:grpSpPr>
+      <p:sp>
+        <p:nvSpPr>
+          <p:cNvPr id="2" name="Title 1"/>
+          <p:cNvSpPr>
+            <a:spLocks noGrp="1"/>
+          </p:cNvSpPr>
+          <p:nvPr>
+            <p:ph type="title"/>
+          </p:nvPr>
+        </p:nvSpPr>
+        <p:spPr>
+          <a:xfrm>
             <a:off x="513524" y="366436"/>
             <a:ext cx="8534400" cy="1507067"/>
           </a:xfrm>
@@ -5810,7 +5933,7 @@
         </p:blipFill>
         <p:spPr bwMode="auto">
           <a:xfrm>
-            <a:off x="1167472" y="1980422"/>
+            <a:off x="1553477" y="1968971"/>
             <a:ext cx="5231876" cy="1668826"/>
           </a:xfrm>
           <a:prstGeom prst="rect">
@@ -5885,7 +6008,7 @@
         </p:blipFill>
         <p:spPr>
           <a:xfrm>
-            <a:off x="4169415" y="3983238"/>
+            <a:off x="4376805" y="3994689"/>
             <a:ext cx="4459866" cy="1490120"/>
           </a:xfrm>
           <a:prstGeom prst="rect">
@@ -5916,7 +6039,7 @@
         </p:blipFill>
         <p:spPr bwMode="auto">
           <a:xfrm>
-            <a:off x="7266400" y="1980423"/>
+            <a:off x="7738519" y="1980422"/>
             <a:ext cx="1781524" cy="1668826"/>
           </a:xfrm>
           <a:prstGeom prst="rect">
@@ -5947,7 +6070,7 @@
 </p:sld>
 </file>
 
-<file path=ppt/slides/slide4.xml><?xml version="1.0" encoding="utf-8"?>
+<file path=ppt/slides/slide5.xml><?xml version="1.0" encoding="utf-8"?>
 <p:sld xmlns:a="http://schemas.openxmlformats.org/drawingml/2006/main" xmlns:r="http://schemas.openxmlformats.org/officeDocument/2006/relationships" xmlns:p="http://schemas.openxmlformats.org/presentationml/2006/main">
   <p:cSld>
     <p:spTree>
@@ -6027,7 +6150,7 @@
         <p:spPr>
           <a:xfrm>
             <a:off x="513524" y="2218944"/>
-            <a:ext cx="11239564" cy="4422817"/>
+            <a:ext cx="11232323" cy="4422817"/>
           </a:xfrm>
         </p:spPr>
         <p:txBody>
@@ -6064,7 +6187,7 @@
         </p:blipFill>
         <p:spPr bwMode="auto">
           <a:xfrm>
-            <a:off x="2045553" y="2168399"/>
+            <a:off x="1594430" y="2218944"/>
             <a:ext cx="2314108" cy="1162067"/>
           </a:xfrm>
           <a:prstGeom prst="rect">
@@ -6105,7 +6228,7 @@
         </p:blipFill>
         <p:spPr bwMode="auto">
           <a:xfrm>
-            <a:off x="1682448" y="3713368"/>
+            <a:off x="812006" y="3911774"/>
             <a:ext cx="2545238" cy="2456155"/>
           </a:xfrm>
           <a:prstGeom prst="rect">
@@ -6146,7 +6269,7 @@
         </p:blipFill>
         <p:spPr bwMode="auto">
           <a:xfrm>
-            <a:off x="5610064" y="1733739"/>
+            <a:off x="5006748" y="1823634"/>
             <a:ext cx="2446310" cy="1838227"/>
           </a:xfrm>
           <a:prstGeom prst="rect">
@@ -6187,7 +6310,7 @@
         </p:blipFill>
         <p:spPr bwMode="auto">
           <a:xfrm>
-            <a:off x="5220574" y="4355184"/>
+            <a:off x="6229903" y="4192623"/>
             <a:ext cx="3640621" cy="1178350"/>
           </a:xfrm>
           <a:prstGeom prst="rect">
@@ -6205,117 +6328,107 @@
           </a:extLst>
         </p:spPr>
       </p:pic>
+      <p:pic>
+        <p:nvPicPr>
+          <p:cNvPr id="1026" name="Picture 2" descr="ttp://docs.celeryproject.org/en/latest/_static/celery_512.png"/>
+          <p:cNvPicPr>
+            <a:picLocks noChangeAspect="1" noChangeArrowheads="1"/>
+          </p:cNvPicPr>
+          <p:nvPr/>
+        </p:nvPicPr>
+        <p:blipFill>
+          <a:blip r:embed="rId6">
+            <a:extLst>
+              <a:ext uri="{28A0092B-C50C-407E-A947-70E740481C1C}">
+                <a14:useLocalDpi xmlns:a14="http://schemas.microsoft.com/office/drawing/2010/main" val="0"/>
+              </a:ext>
+            </a:extLst>
+          </a:blip>
+          <a:srcRect/>
+          <a:stretch>
+            <a:fillRect/>
+          </a:stretch>
+        </p:blipFill>
+        <p:spPr bwMode="auto">
+          <a:xfrm>
+            <a:off x="8715725" y="1560401"/>
+            <a:ext cx="2038271" cy="2038271"/>
+          </a:xfrm>
+          <a:prstGeom prst="rect">
+            <a:avLst/>
+          </a:prstGeom>
+          <a:noFill/>
+          <a:extLst>
+            <a:ext uri="{909E8E84-426E-40DD-AFC4-6F175D3DCCD1}">
+              <a14:hiddenFill xmlns:a14="http://schemas.microsoft.com/office/drawing/2010/main">
+                <a:solidFill>
+                  <a:srgbClr val="FFFFFF"/>
+                </a:solidFill>
+              </a14:hiddenFill>
+            </a:ext>
+          </a:extLst>
+        </p:spPr>
+      </p:pic>
+      <p:pic>
+        <p:nvPicPr>
+          <p:cNvPr id="1032" name="Picture 8" descr="ttp://programmersdiary.com/wp-content/uploads/2016/01/pandas2.jpg"/>
+          <p:cNvPicPr>
+            <a:picLocks noChangeAspect="1" noChangeArrowheads="1"/>
+          </p:cNvPicPr>
+          <p:nvPr/>
+        </p:nvPicPr>
+        <p:blipFill>
+          <a:blip r:embed="rId7">
+            <a:extLst>
+              <a:ext uri="{BEBA8EAE-BF5A-486C-A8C5-ECC9F3942E4B}">
+                <a14:imgProps xmlns:a14="http://schemas.microsoft.com/office/drawing/2010/main">
+                  <a14:imgLayer r:embed="rId8">
+                    <a14:imgEffect>
+                      <a14:backgroundRemoval t="67576" b="92727" l="27355" r="75484">
+                        <a14:foregroundMark x1="41290" y1="80909" x2="41290" y2="80909"/>
+                        <a14:foregroundMark x1="48000" y1="81515" x2="48000" y2="81515"/>
+                        <a14:foregroundMark x1="52903" y1="78788" x2="52903" y2="78788"/>
+                        <a14:foregroundMark x1="58581" y1="77273" x2="58581" y2="77273"/>
+                        <a14:foregroundMark x1="65419" y1="77576" x2="65419" y2="77576"/>
+                      </a14:backgroundRemoval>
+                    </a14:imgEffect>
+                  </a14:imgLayer>
+                </a14:imgProps>
+              </a:ext>
+              <a:ext uri="{28A0092B-C50C-407E-A947-70E740481C1C}">
+                <a14:useLocalDpi xmlns:a14="http://schemas.microsoft.com/office/drawing/2010/main" val="0"/>
+              </a:ext>
+            </a:extLst>
+          </a:blip>
+          <a:srcRect/>
+          <a:stretch>
+            <a:fillRect/>
+          </a:stretch>
+        </p:blipFill>
+        <p:spPr bwMode="auto">
+          <a:xfrm>
+            <a:off x="2160430" y="3353981"/>
+            <a:ext cx="4594426" cy="1932845"/>
+          </a:xfrm>
+          <a:prstGeom prst="rect">
+            <a:avLst/>
+          </a:prstGeom>
+          <a:noFill/>
+          <a:extLst>
+            <a:ext uri="{909E8E84-426E-40DD-AFC4-6F175D3DCCD1}">
+              <a14:hiddenFill xmlns:a14="http://schemas.microsoft.com/office/drawing/2010/main">
+                <a:solidFill>
+                  <a:srgbClr val="FFFFFF"/>
+                </a:solidFill>
+              </a14:hiddenFill>
+            </a:ext>
+          </a:extLst>
+        </p:spPr>
+      </p:pic>
     </p:spTree>
     <p:extLst>
       <p:ext uri="{BB962C8B-B14F-4D97-AF65-F5344CB8AC3E}">
         <p14:creationId xmlns:p14="http://schemas.microsoft.com/office/powerpoint/2010/main" val="181271508"/>
-      </p:ext>
-    </p:extLst>
-  </p:cSld>
-  <p:clrMapOvr>
-    <a:masterClrMapping/>
-  </p:clrMapOvr>
-</p:sld>
-</file>
-
-<file path=ppt/slides/slide5.xml><?xml version="1.0" encoding="utf-8"?>
-<p:sld xmlns:a="http://schemas.openxmlformats.org/drawingml/2006/main" xmlns:r="http://schemas.openxmlformats.org/officeDocument/2006/relationships" xmlns:p="http://schemas.openxmlformats.org/presentationml/2006/main">
-  <p:cSld>
-    <p:spTree>
-      <p:nvGrpSpPr>
-        <p:cNvPr id="1" name=""/>
-        <p:cNvGrpSpPr/>
-        <p:nvPr/>
-      </p:nvGrpSpPr>
-      <p:grpSpPr>
-        <a:xfrm>
-          <a:off x="0" y="0"/>
-          <a:ext cx="0" cy="0"/>
-          <a:chOff x="0" y="0"/>
-          <a:chExt cx="0" cy="0"/>
-        </a:xfrm>
-      </p:grpSpPr>
-      <p:sp>
-        <p:nvSpPr>
-          <p:cNvPr id="2" name="Title 1"/>
-          <p:cNvSpPr>
-            <a:spLocks noGrp="1"/>
-          </p:cNvSpPr>
-          <p:nvPr>
-            <p:ph type="title"/>
-          </p:nvPr>
-        </p:nvSpPr>
-        <p:spPr>
-          <a:xfrm>
-            <a:off x="2271859" y="1885361"/>
-            <a:ext cx="6890191" cy="1517715"/>
-          </a:xfrm>
-        </p:spPr>
-        <p:txBody>
-          <a:bodyPr>
-            <a:normAutofit fontScale="90000"/>
-          </a:bodyPr>
-          <a:lstStyle/>
-          <a:p>
-            <a:pPr algn="ctr"/>
-            <a:r>
-              <a:rPr lang="en-US" sz="6600" b="1" dirty="0" smtClean="0">
-                <a:solidFill>
-                  <a:schemeClr val="accent4">
-                    <a:lumMod val="20000"/>
-                    <a:lumOff val="80000"/>
-                  </a:schemeClr>
-                </a:solidFill>
-              </a:rPr>
-              <a:t/>
-            </a:r>
-            <a:br>
-              <a:rPr lang="en-US" sz="6600" b="1" dirty="0" smtClean="0">
-                <a:solidFill>
-                  <a:schemeClr val="accent4">
-                    <a:lumMod val="20000"/>
-                    <a:lumOff val="80000"/>
-                  </a:schemeClr>
-                </a:solidFill>
-              </a:rPr>
-            </a:br>
-            <a:r>
-              <a:rPr lang="en-US" sz="5300" b="1" dirty="0" err="1" smtClean="0">
-                <a:solidFill>
-                  <a:schemeClr val="accent4">
-                    <a:lumMod val="20000"/>
-                    <a:lumOff val="80000"/>
-                  </a:schemeClr>
-                </a:solidFill>
-              </a:rPr>
-              <a:t>DEMOnstration</a:t>
-            </a:r>
-            <a:r>
-              <a:rPr lang="en-US" sz="5300" b="1" dirty="0" smtClean="0">
-                <a:solidFill>
-                  <a:schemeClr val="accent4">
-                    <a:lumMod val="20000"/>
-                    <a:lumOff val="80000"/>
-                  </a:schemeClr>
-                </a:solidFill>
-              </a:rPr>
-              <a:t>!</a:t>
-            </a:r>
-            <a:endParaRPr lang="en-US" sz="5300" b="1" dirty="0">
-              <a:solidFill>
-                <a:schemeClr val="accent4">
-                  <a:lumMod val="20000"/>
-                  <a:lumOff val="80000"/>
-                </a:schemeClr>
-              </a:solidFill>
-            </a:endParaRPr>
-          </a:p>
-        </p:txBody>
-      </p:sp>
-    </p:spTree>
-    <p:extLst>
-      <p:ext uri="{BB962C8B-B14F-4D97-AF65-F5344CB8AC3E}">
-        <p14:creationId xmlns:p14="http://schemas.microsoft.com/office/powerpoint/2010/main" val="816969576"/>
       </p:ext>
     </p:extLst>
   </p:cSld>
@@ -6429,8 +6542,32 @@
                   <a:schemeClr val="tx1"/>
                 </a:solidFill>
               </a:rPr>
-              <a:t>Created a massive database with 108 million rows of data</a:t>
-            </a:r>
+              <a:t>Created a massive database with 108 million rows of </a:t>
+            </a:r>
+            <a:r>
+              <a:rPr lang="en-US" b="1" dirty="0" smtClean="0">
+                <a:solidFill>
+                  <a:schemeClr val="tx1"/>
+                </a:solidFill>
+              </a:rPr>
+              <a:t>data</a:t>
+            </a:r>
+          </a:p>
+          <a:p>
+            <a:pPr lvl="1"/>
+            <a:r>
+              <a:rPr lang="en-US" b="1" dirty="0" smtClean="0">
+                <a:solidFill>
+                  <a:schemeClr val="tx1"/>
+                </a:solidFill>
+              </a:rPr>
+              <a:t>Automatically buys and sells stocks</a:t>
+            </a:r>
+            <a:endParaRPr lang="en-US" b="1" dirty="0" smtClean="0">
+              <a:solidFill>
+                <a:schemeClr val="tx1"/>
+              </a:solidFill>
+            </a:endParaRPr>
           </a:p>
           <a:p>
             <a:pPr lvl="1"/>
@@ -6557,7 +6694,26 @@
                   <a:schemeClr val="tx1"/>
                 </a:solidFill>
               </a:rPr>
-              <a:t> back-test takes about 15 minutes</a:t>
+              <a:t> back-test takes about 15 </a:t>
+            </a:r>
+            <a:r>
+              <a:rPr lang="en-US" b="1" dirty="0" smtClean="0">
+                <a:solidFill>
+                  <a:schemeClr val="tx1"/>
+                </a:solidFill>
+              </a:rPr>
+              <a:t>minutes</a:t>
+            </a:r>
+          </a:p>
+          <a:p>
+            <a:pPr lvl="1"/>
+            <a:r>
+              <a:rPr lang="en-US" b="1" dirty="0" smtClean="0">
+                <a:solidFill>
+                  <a:schemeClr val="tx1"/>
+                </a:solidFill>
+              </a:rPr>
+              <a:t>Chart creation</a:t>
             </a:r>
             <a:endParaRPr lang="en-US" b="1" dirty="0">
               <a:solidFill>
@@ -6617,6 +6773,102 @@
         </p:nvSpPr>
         <p:spPr>
           <a:xfrm>
+            <a:off x="2271859" y="1885361"/>
+            <a:ext cx="6890191" cy="1517715"/>
+          </a:xfrm>
+        </p:spPr>
+        <p:txBody>
+          <a:bodyPr>
+            <a:normAutofit fontScale="90000"/>
+          </a:bodyPr>
+          <a:lstStyle/>
+          <a:p>
+            <a:pPr algn="ctr"/>
+            <a:r>
+              <a:rPr lang="en-US" sz="6600" b="1" dirty="0" smtClean="0">
+                <a:solidFill>
+                  <a:schemeClr val="accent4">
+                    <a:lumMod val="20000"/>
+                    <a:lumOff val="80000"/>
+                  </a:schemeClr>
+                </a:solidFill>
+              </a:rPr>
+              <a:t/>
+            </a:r>
+            <a:br>
+              <a:rPr lang="en-US" sz="6600" b="1" dirty="0" smtClean="0">
+                <a:solidFill>
+                  <a:schemeClr val="accent4">
+                    <a:lumMod val="20000"/>
+                    <a:lumOff val="80000"/>
+                  </a:schemeClr>
+                </a:solidFill>
+              </a:rPr>
+            </a:br>
+            <a:r>
+              <a:rPr lang="en-US" sz="5300" b="1" dirty="0" smtClean="0">
+                <a:solidFill>
+                  <a:schemeClr val="accent4">
+                    <a:lumMod val="20000"/>
+                    <a:lumOff val="80000"/>
+                  </a:schemeClr>
+                </a:solidFill>
+              </a:rPr>
+              <a:t>Demonstration!</a:t>
+            </a:r>
+            <a:endParaRPr lang="en-US" sz="5300" b="1" dirty="0">
+              <a:solidFill>
+                <a:schemeClr val="accent4">
+                  <a:lumMod val="20000"/>
+                  <a:lumOff val="80000"/>
+                </a:schemeClr>
+              </a:solidFill>
+            </a:endParaRPr>
+          </a:p>
+        </p:txBody>
+      </p:sp>
+    </p:spTree>
+    <p:extLst>
+      <p:ext uri="{BB962C8B-B14F-4D97-AF65-F5344CB8AC3E}">
+        <p14:creationId xmlns:p14="http://schemas.microsoft.com/office/powerpoint/2010/main" val="185196213"/>
+      </p:ext>
+    </p:extLst>
+  </p:cSld>
+  <p:clrMapOvr>
+    <a:masterClrMapping/>
+  </p:clrMapOvr>
+</p:sld>
+</file>
+
+<file path=ppt/slides/slide8.xml><?xml version="1.0" encoding="utf-8"?>
+<p:sld xmlns:a="http://schemas.openxmlformats.org/drawingml/2006/main" xmlns:r="http://schemas.openxmlformats.org/officeDocument/2006/relationships" xmlns:p="http://schemas.openxmlformats.org/presentationml/2006/main">
+  <p:cSld>
+    <p:spTree>
+      <p:nvGrpSpPr>
+        <p:cNvPr id="1" name=""/>
+        <p:cNvGrpSpPr/>
+        <p:nvPr/>
+      </p:nvGrpSpPr>
+      <p:grpSpPr>
+        <a:xfrm>
+          <a:off x="0" y="0"/>
+          <a:ext cx="0" cy="0"/>
+          <a:chOff x="0" y="0"/>
+          <a:chExt cx="0" cy="0"/>
+        </a:xfrm>
+      </p:grpSpPr>
+      <p:sp>
+        <p:nvSpPr>
+          <p:cNvPr id="2" name="Title 1"/>
+          <p:cNvSpPr>
+            <a:spLocks noGrp="1"/>
+          </p:cNvSpPr>
+          <p:nvPr>
+            <p:ph type="title"/>
+          </p:nvPr>
+        </p:nvSpPr>
+        <p:spPr>
+          <a:xfrm>
             <a:off x="611060" y="560832"/>
             <a:ext cx="9057196" cy="1507067"/>
           </a:xfrm>
@@ -6727,7 +6979,25 @@
                   <a:schemeClr val="tx1"/>
                 </a:solidFill>
               </a:rPr>
-              <a:t>Implement live-trading</a:t>
+              <a:t>Implement </a:t>
+            </a:r>
+            <a:r>
+              <a:rPr lang="en-US" b="1" dirty="0" smtClean="0">
+                <a:solidFill>
+                  <a:schemeClr val="tx1"/>
+                </a:solidFill>
+              </a:rPr>
+              <a:t>live-trading</a:t>
+            </a:r>
+          </a:p>
+          <a:p>
+            <a:r>
+              <a:rPr lang="en-US" b="1" dirty="0" smtClean="0">
+                <a:solidFill>
+                  <a:schemeClr val="tx1"/>
+                </a:solidFill>
+              </a:rPr>
+              <a:t>Add stats: winners, losers, buys, sells, turnover time, etc.</a:t>
             </a:r>
             <a:endParaRPr lang="en-US" b="1" dirty="0">
               <a:solidFill>
@@ -6758,7 +7028,7 @@
 </p:sld>
 </file>
 
-<file path=ppt/slides/slide8.xml><?xml version="1.0" encoding="utf-8"?>
+<file path=ppt/slides/slide9.xml><?xml version="1.0" encoding="utf-8"?>
 <p:sld xmlns:a="http://schemas.openxmlformats.org/drawingml/2006/main" xmlns:r="http://schemas.openxmlformats.org/officeDocument/2006/relationships" xmlns:p="http://schemas.openxmlformats.org/presentationml/2006/main">
   <p:cSld>
     <p:spTree>

</xml_diff>